<commit_message>
Updated documentation to match code after refactoring
</commit_message>
<xml_diff>
--- a/Documentation/WeatherZilla_Documentation.pptx
+++ b/Documentation/WeatherZilla_Documentation.pptx
@@ -296,7 +296,7 @@
           <a:p>
             <a:fld id="{79CE602E-596E-4A57-8D86-72AD983DD3AE}" type="datetimeFigureOut">
               <a:rPr lang="en-US" smtClean="0"/>
-              <a:t>5/14/2022</a:t>
+              <a:t>5/15/2022</a:t>
             </a:fld>
             <a:endParaRPr lang="en-US"/>
           </a:p>
@@ -494,7 +494,7 @@
           <a:p>
             <a:fld id="{79CE602E-596E-4A57-8D86-72AD983DD3AE}" type="datetimeFigureOut">
               <a:rPr lang="en-US" smtClean="0"/>
-              <a:t>5/14/2022</a:t>
+              <a:t>5/15/2022</a:t>
             </a:fld>
             <a:endParaRPr lang="en-US"/>
           </a:p>
@@ -702,7 +702,7 @@
           <a:p>
             <a:fld id="{79CE602E-596E-4A57-8D86-72AD983DD3AE}" type="datetimeFigureOut">
               <a:rPr lang="en-US" smtClean="0"/>
-              <a:t>5/14/2022</a:t>
+              <a:t>5/15/2022</a:t>
             </a:fld>
             <a:endParaRPr lang="en-US"/>
           </a:p>
@@ -900,7 +900,7 @@
           <a:p>
             <a:fld id="{79CE602E-596E-4A57-8D86-72AD983DD3AE}" type="datetimeFigureOut">
               <a:rPr lang="en-US" smtClean="0"/>
-              <a:t>5/14/2022</a:t>
+              <a:t>5/15/2022</a:t>
             </a:fld>
             <a:endParaRPr lang="en-US"/>
           </a:p>
@@ -1175,7 +1175,7 @@
           <a:p>
             <a:fld id="{79CE602E-596E-4A57-8D86-72AD983DD3AE}" type="datetimeFigureOut">
               <a:rPr lang="en-US" smtClean="0"/>
-              <a:t>5/14/2022</a:t>
+              <a:t>5/15/2022</a:t>
             </a:fld>
             <a:endParaRPr lang="en-US"/>
           </a:p>
@@ -1440,7 +1440,7 @@
           <a:p>
             <a:fld id="{79CE602E-596E-4A57-8D86-72AD983DD3AE}" type="datetimeFigureOut">
               <a:rPr lang="en-US" smtClean="0"/>
-              <a:t>5/14/2022</a:t>
+              <a:t>5/15/2022</a:t>
             </a:fld>
             <a:endParaRPr lang="en-US"/>
           </a:p>
@@ -1852,7 +1852,7 @@
           <a:p>
             <a:fld id="{79CE602E-596E-4A57-8D86-72AD983DD3AE}" type="datetimeFigureOut">
               <a:rPr lang="en-US" smtClean="0"/>
-              <a:t>5/14/2022</a:t>
+              <a:t>5/15/2022</a:t>
             </a:fld>
             <a:endParaRPr lang="en-US"/>
           </a:p>
@@ -1993,7 +1993,7 @@
           <a:p>
             <a:fld id="{79CE602E-596E-4A57-8D86-72AD983DD3AE}" type="datetimeFigureOut">
               <a:rPr lang="en-US" smtClean="0"/>
-              <a:t>5/14/2022</a:t>
+              <a:t>5/15/2022</a:t>
             </a:fld>
             <a:endParaRPr lang="en-US"/>
           </a:p>
@@ -2106,7 +2106,7 @@
           <a:p>
             <a:fld id="{79CE602E-596E-4A57-8D86-72AD983DD3AE}" type="datetimeFigureOut">
               <a:rPr lang="en-US" smtClean="0"/>
-              <a:t>5/14/2022</a:t>
+              <a:t>5/15/2022</a:t>
             </a:fld>
             <a:endParaRPr lang="en-US"/>
           </a:p>
@@ -2417,7 +2417,7 @@
           <a:p>
             <a:fld id="{79CE602E-596E-4A57-8D86-72AD983DD3AE}" type="datetimeFigureOut">
               <a:rPr lang="en-US" smtClean="0"/>
-              <a:t>5/14/2022</a:t>
+              <a:t>5/15/2022</a:t>
             </a:fld>
             <a:endParaRPr lang="en-US"/>
           </a:p>
@@ -2705,7 +2705,7 @@
           <a:p>
             <a:fld id="{79CE602E-596E-4A57-8D86-72AD983DD3AE}" type="datetimeFigureOut">
               <a:rPr lang="en-US" smtClean="0"/>
-              <a:t>5/14/2022</a:t>
+              <a:t>5/15/2022</a:t>
             </a:fld>
             <a:endParaRPr lang="en-US"/>
           </a:p>
@@ -2946,7 +2946,7 @@
           <a:p>
             <a:fld id="{79CE602E-596E-4A57-8D86-72AD983DD3AE}" type="datetimeFigureOut">
               <a:rPr lang="en-US" smtClean="0"/>
-              <a:t>5/14/2022</a:t>
+              <a:t>5/15/2022</a:t>
             </a:fld>
             <a:endParaRPr lang="en-US"/>
           </a:p>
@@ -3741,7 +3741,7 @@
         <p:spPr>
           <a:xfrm>
             <a:off x="4809066" y="3263900"/>
-            <a:ext cx="1727200" cy="2677656"/>
+            <a:ext cx="1727200" cy="954107"/>
           </a:xfrm>
           <a:prstGeom prst="rect">
             <a:avLst/>
@@ -3780,47 +3780,6 @@
               <a:rPr lang="en-US" sz="1400" i="1" dirty="0"/>
               <a:t>/</a:t>
             </a:r>
-            <a:r>
-              <a:rPr lang="en-US" sz="1400" dirty="0"/>
-              <a:t> – but via Azure API Management Service also configured to be called via </a:t>
-            </a:r>
-            <a:r>
-              <a:rPr kumimoji="0" lang="en-US" altLang="en-US" sz="1400" b="0" i="1" u="none" strike="noStrike" cap="none" normalizeH="0" baseline="0" dirty="0">
-                <a:ln>
-                  <a:noFill/>
-                </a:ln>
-                <a:solidFill>
-                  <a:srgbClr val="333333"/>
-                </a:solidFill>
-                <a:effectLst/>
-                <a:latin typeface="Menlo"/>
-              </a:rPr>
-              <a:t>https://weatherzillawebapi.azure-api.net/api/</a:t>
-            </a:r>
-            <a:r>
-              <a:rPr kumimoji="0" lang="en-US" altLang="en-US" sz="800" b="0" i="0" u="none" strike="noStrike" cap="none" normalizeH="0" baseline="0" dirty="0">
-                <a:ln>
-                  <a:noFill/>
-                </a:ln>
-                <a:solidFill>
-                  <a:schemeClr val="tx1"/>
-                </a:solidFill>
-                <a:effectLst/>
-              </a:rPr>
-              <a:t> </a:t>
-            </a:r>
-            <a:endParaRPr kumimoji="0" lang="en-US" altLang="en-US" sz="3200" b="0" i="0" u="none" strike="noStrike" cap="none" normalizeH="0" baseline="0" dirty="0">
-              <a:ln>
-                <a:noFill/>
-              </a:ln>
-              <a:solidFill>
-                <a:schemeClr val="tx1"/>
-              </a:solidFill>
-              <a:effectLst/>
-              <a:latin typeface="Arial" panose="020B0604020202020204" pitchFamily="34" charset="0"/>
-            </a:endParaRPr>
-          </a:p>
-          <a:p>
             <a:endParaRPr lang="en-US" sz="1400" dirty="0"/>
           </a:p>
         </p:txBody>
@@ -4025,8 +3984,8 @@
         </p:nvSpPr>
         <p:spPr>
           <a:xfrm>
-            <a:off x="2937934" y="1011766"/>
-            <a:ext cx="2230966" cy="685800"/>
+            <a:off x="2942167" y="553435"/>
+            <a:ext cx="2230966" cy="889000"/>
           </a:xfrm>
           <a:prstGeom prst="wedgeRectCallout">
             <a:avLst>
@@ -4061,13 +4020,34 @@
               <a:t>Data received as defined in class </a:t>
             </a:r>
             <a:r>
+              <a:rPr lang="en-US" sz="1200" i="1" dirty="0" err="1">
+                <a:solidFill>
+                  <a:srgbClr val="000000"/>
+                </a:solidFill>
+                <a:latin typeface="Cascadia Mono" panose="020B0609020000020004" pitchFamily="49" charset="0"/>
+              </a:rPr>
+              <a:t>WeatherZilla.Shared</a:t>
+            </a:r>
+            <a:r>
               <a:rPr lang="en-US" sz="1200" i="1" dirty="0">
                 <a:solidFill>
                   <a:srgbClr val="000000"/>
                 </a:solidFill>
                 <a:latin typeface="Cascadia Mono" panose="020B0609020000020004" pitchFamily="49" charset="0"/>
               </a:rPr>
-              <a:t>WeatherZillaData.</a:t>
+              <a:t>.</a:t>
+            </a:r>
+          </a:p>
+          <a:p>
+            <a:pPr algn="ctr"/>
+            <a:r>
+              <a:rPr lang="en-US" sz="1200" i="1" dirty="0">
+                <a:solidFill>
+                  <a:srgbClr val="000000"/>
+                </a:solidFill>
+                <a:latin typeface="Cascadia Mono" panose="020B0609020000020004" pitchFamily="49" charset="0"/>
+              </a:rPr>
+              <a:t>Interfaces.</a:t>
             </a:r>
             <a:br>
               <a:rPr lang="en-US" sz="1200" i="1" dirty="0">
@@ -4104,8 +4084,8 @@
         </p:nvSpPr>
         <p:spPr>
           <a:xfrm>
-            <a:off x="6278033" y="1004431"/>
-            <a:ext cx="2230966" cy="685800"/>
+            <a:off x="6290733" y="677334"/>
+            <a:ext cx="2230966" cy="843564"/>
           </a:xfrm>
           <a:prstGeom prst="wedgeRectCallout">
             <a:avLst>
@@ -4140,13 +4120,39 @@
               <a:t>Data received as defined in class </a:t>
             </a:r>
             <a:r>
+              <a:rPr lang="en-US" sz="1200" i="1" dirty="0" err="1">
+                <a:solidFill>
+                  <a:srgbClr val="000000"/>
+                </a:solidFill>
+                <a:latin typeface="Cascadia Mono" panose="020B0609020000020004" pitchFamily="49" charset="0"/>
+              </a:rPr>
+              <a:t>WeatherZilla.WebAPI</a:t>
+            </a:r>
+            <a:r>
               <a:rPr lang="en-US" sz="1200" i="1" dirty="0">
                 <a:solidFill>
                   <a:srgbClr val="000000"/>
                 </a:solidFill>
                 <a:latin typeface="Cascadia Mono" panose="020B0609020000020004" pitchFamily="49" charset="0"/>
               </a:rPr>
-              <a:t>WeatherWebAPI.Data.</a:t>
+              <a:t>.</a:t>
+            </a:r>
+            <a:br>
+              <a:rPr lang="en-US" sz="1200" i="1" dirty="0">
+                <a:solidFill>
+                  <a:srgbClr val="000000"/>
+                </a:solidFill>
+                <a:latin typeface="Cascadia Mono" panose="020B0609020000020004" pitchFamily="49" charset="0"/>
+              </a:rPr>
+            </a:br>
+            <a:r>
+              <a:rPr lang="en-US" sz="1200" i="1" dirty="0">
+                <a:solidFill>
+                  <a:srgbClr val="000000"/>
+                </a:solidFill>
+                <a:latin typeface="Cascadia Mono" panose="020B0609020000020004" pitchFamily="49" charset="0"/>
+              </a:rPr>
+              <a:t>Data.</a:t>
             </a:r>
             <a:r>
               <a:rPr lang="en-US" sz="1200" i="1" dirty="0">

</xml_diff>